<commit_message>
updated while IO mini lecture:
</commit_message>
<xml_diff>
--- a/julia/introduction/Installation guide.pptx
+++ b/julia/introduction/Installation guide.pptx
@@ -246,7 +246,7 @@
           <a:p>
             <a:fld id="{93A4496A-9D10-4F9B-876E-D9FE17FAE8BB}" type="datetimeFigureOut">
               <a:rPr lang="en-US" smtClean="0"/>
-              <a:t>8/23/2017</a:t>
+              <a:t>8/30/17</a:t>
             </a:fld>
             <a:endParaRPr lang="en-US"/>
           </a:p>
@@ -416,7 +416,7 @@
           <a:p>
             <a:fld id="{93A4496A-9D10-4F9B-876E-D9FE17FAE8BB}" type="datetimeFigureOut">
               <a:rPr lang="en-US" smtClean="0"/>
-              <a:t>8/23/2017</a:t>
+              <a:t>8/30/17</a:t>
             </a:fld>
             <a:endParaRPr lang="en-US"/>
           </a:p>
@@ -596,7 +596,7 @@
           <a:p>
             <a:fld id="{93A4496A-9D10-4F9B-876E-D9FE17FAE8BB}" type="datetimeFigureOut">
               <a:rPr lang="en-US" smtClean="0"/>
-              <a:t>8/23/2017</a:t>
+              <a:t>8/30/17</a:t>
             </a:fld>
             <a:endParaRPr lang="en-US"/>
           </a:p>
@@ -766,7 +766,7 @@
           <a:p>
             <a:fld id="{93A4496A-9D10-4F9B-876E-D9FE17FAE8BB}" type="datetimeFigureOut">
               <a:rPr lang="en-US" smtClean="0"/>
-              <a:t>8/23/2017</a:t>
+              <a:t>8/30/17</a:t>
             </a:fld>
             <a:endParaRPr lang="en-US"/>
           </a:p>
@@ -1012,7 +1012,7 @@
           <a:p>
             <a:fld id="{93A4496A-9D10-4F9B-876E-D9FE17FAE8BB}" type="datetimeFigureOut">
               <a:rPr lang="en-US" smtClean="0"/>
-              <a:t>8/23/2017</a:t>
+              <a:t>8/30/17</a:t>
             </a:fld>
             <a:endParaRPr lang="en-US"/>
           </a:p>
@@ -1244,7 +1244,7 @@
           <a:p>
             <a:fld id="{93A4496A-9D10-4F9B-876E-D9FE17FAE8BB}" type="datetimeFigureOut">
               <a:rPr lang="en-US" smtClean="0"/>
-              <a:t>8/23/2017</a:t>
+              <a:t>8/30/17</a:t>
             </a:fld>
             <a:endParaRPr lang="en-US"/>
           </a:p>
@@ -1611,7 +1611,7 @@
           <a:p>
             <a:fld id="{93A4496A-9D10-4F9B-876E-D9FE17FAE8BB}" type="datetimeFigureOut">
               <a:rPr lang="en-US" smtClean="0"/>
-              <a:t>8/23/2017</a:t>
+              <a:t>8/30/17</a:t>
             </a:fld>
             <a:endParaRPr lang="en-US"/>
           </a:p>
@@ -1729,7 +1729,7 @@
           <a:p>
             <a:fld id="{93A4496A-9D10-4F9B-876E-D9FE17FAE8BB}" type="datetimeFigureOut">
               <a:rPr lang="en-US" smtClean="0"/>
-              <a:t>8/23/2017</a:t>
+              <a:t>8/30/17</a:t>
             </a:fld>
             <a:endParaRPr lang="en-US"/>
           </a:p>
@@ -1824,7 +1824,7 @@
           <a:p>
             <a:fld id="{93A4496A-9D10-4F9B-876E-D9FE17FAE8BB}" type="datetimeFigureOut">
               <a:rPr lang="en-US" smtClean="0"/>
-              <a:t>8/23/2017</a:t>
+              <a:t>8/30/17</a:t>
             </a:fld>
             <a:endParaRPr lang="en-US"/>
           </a:p>
@@ -2101,7 +2101,7 @@
           <a:p>
             <a:fld id="{93A4496A-9D10-4F9B-876E-D9FE17FAE8BB}" type="datetimeFigureOut">
               <a:rPr lang="en-US" smtClean="0"/>
-              <a:t>8/23/2017</a:t>
+              <a:t>8/30/17</a:t>
             </a:fld>
             <a:endParaRPr lang="en-US"/>
           </a:p>
@@ -2354,7 +2354,7 @@
           <a:p>
             <a:fld id="{93A4496A-9D10-4F9B-876E-D9FE17FAE8BB}" type="datetimeFigureOut">
               <a:rPr lang="en-US" smtClean="0"/>
-              <a:t>8/23/2017</a:t>
+              <a:t>8/30/17</a:t>
             </a:fld>
             <a:endParaRPr lang="en-US"/>
           </a:p>
@@ -2567,7 +2567,7 @@
           <a:p>
             <a:fld id="{93A4496A-9D10-4F9B-876E-D9FE17FAE8BB}" type="datetimeFigureOut">
               <a:rPr lang="en-US" smtClean="0"/>
-              <a:t>8/23/2017</a:t>
+              <a:t>8/30/17</a:t>
             </a:fld>
             <a:endParaRPr lang="en-US"/>
           </a:p>
@@ -3195,84 +3195,84 @@
                 <a:gridCol w="896297">
                   <a:extLst>
                     <a:ext uri="{9D8B030D-6E8A-4147-A177-3AD203B41FA5}">
-                      <a16:colId xmlns:a16="http://schemas.microsoft.com/office/drawing/2014/main" val="20000"/>
+                      <a16:colId xmlns:a16="http://schemas.microsoft.com/office/drawing/2014/main" xmlns="" val="20000"/>
                     </a:ext>
                   </a:extLst>
                 </a:gridCol>
                 <a:gridCol w="896297">
                   <a:extLst>
                     <a:ext uri="{9D8B030D-6E8A-4147-A177-3AD203B41FA5}">
-                      <a16:colId xmlns:a16="http://schemas.microsoft.com/office/drawing/2014/main" val="20001"/>
+                      <a16:colId xmlns:a16="http://schemas.microsoft.com/office/drawing/2014/main" xmlns="" val="20001"/>
                     </a:ext>
                   </a:extLst>
                 </a:gridCol>
                 <a:gridCol w="834646">
                   <a:extLst>
                     <a:ext uri="{9D8B030D-6E8A-4147-A177-3AD203B41FA5}">
-                      <a16:colId xmlns:a16="http://schemas.microsoft.com/office/drawing/2014/main" val="20002"/>
+                      <a16:colId xmlns:a16="http://schemas.microsoft.com/office/drawing/2014/main" xmlns="" val="20002"/>
                     </a:ext>
                   </a:extLst>
                 </a:gridCol>
                 <a:gridCol w="953203">
                   <a:extLst>
                     <a:ext uri="{9D8B030D-6E8A-4147-A177-3AD203B41FA5}">
-                      <a16:colId xmlns:a16="http://schemas.microsoft.com/office/drawing/2014/main" val="20003"/>
+                      <a16:colId xmlns:a16="http://schemas.microsoft.com/office/drawing/2014/main" xmlns="" val="20003"/>
                     </a:ext>
                   </a:extLst>
                 </a:gridCol>
                 <a:gridCol w="1081246">
                   <a:extLst>
                     <a:ext uri="{9D8B030D-6E8A-4147-A177-3AD203B41FA5}">
-                      <a16:colId xmlns:a16="http://schemas.microsoft.com/office/drawing/2014/main" val="20004"/>
+                      <a16:colId xmlns:a16="http://schemas.microsoft.com/office/drawing/2014/main" xmlns="" val="20004"/>
                     </a:ext>
                   </a:extLst>
                 </a:gridCol>
                 <a:gridCol w="1100215">
                   <a:extLst>
                     <a:ext uri="{9D8B030D-6E8A-4147-A177-3AD203B41FA5}">
-                      <a16:colId xmlns:a16="http://schemas.microsoft.com/office/drawing/2014/main" val="20005"/>
+                      <a16:colId xmlns:a16="http://schemas.microsoft.com/office/drawing/2014/main" xmlns="" val="20005"/>
                     </a:ext>
                   </a:extLst>
                 </a:gridCol>
                 <a:gridCol w="1214030">
                   <a:extLst>
                     <a:ext uri="{9D8B030D-6E8A-4147-A177-3AD203B41FA5}">
-                      <a16:colId xmlns:a16="http://schemas.microsoft.com/office/drawing/2014/main" val="20006"/>
+                      <a16:colId xmlns:a16="http://schemas.microsoft.com/office/drawing/2014/main" xmlns="" val="20006"/>
                     </a:ext>
                   </a:extLst>
                 </a:gridCol>
                 <a:gridCol w="1062276">
                   <a:extLst>
                     <a:ext uri="{9D8B030D-6E8A-4147-A177-3AD203B41FA5}">
-                      <a16:colId xmlns:a16="http://schemas.microsoft.com/office/drawing/2014/main" val="20007"/>
+                      <a16:colId xmlns:a16="http://schemas.microsoft.com/office/drawing/2014/main" xmlns="" val="20007"/>
                     </a:ext>
                   </a:extLst>
                 </a:gridCol>
                 <a:gridCol w="948461">
                   <a:extLst>
                     <a:ext uri="{9D8B030D-6E8A-4147-A177-3AD203B41FA5}">
-                      <a16:colId xmlns:a16="http://schemas.microsoft.com/office/drawing/2014/main" val="20008"/>
+                      <a16:colId xmlns:a16="http://schemas.microsoft.com/office/drawing/2014/main" xmlns="" val="20008"/>
                     </a:ext>
                   </a:extLst>
                 </a:gridCol>
                 <a:gridCol w="834646">
                   <a:extLst>
                     <a:ext uri="{9D8B030D-6E8A-4147-A177-3AD203B41FA5}">
-                      <a16:colId xmlns:a16="http://schemas.microsoft.com/office/drawing/2014/main" val="20009"/>
+                      <a16:colId xmlns:a16="http://schemas.microsoft.com/office/drawing/2014/main" xmlns="" val="20009"/>
                     </a:ext>
                   </a:extLst>
                 </a:gridCol>
                 <a:gridCol w="839388">
                   <a:extLst>
                     <a:ext uri="{9D8B030D-6E8A-4147-A177-3AD203B41FA5}">
-                      <a16:colId xmlns:a16="http://schemas.microsoft.com/office/drawing/2014/main" val="20010"/>
+                      <a16:colId xmlns:a16="http://schemas.microsoft.com/office/drawing/2014/main" xmlns="" val="20010"/>
                     </a:ext>
                   </a:extLst>
                 </a:gridCol>
                 <a:gridCol w="896297">
                   <a:extLst>
                     <a:ext uri="{9D8B030D-6E8A-4147-A177-3AD203B41FA5}">
-                      <a16:colId xmlns:a16="http://schemas.microsoft.com/office/drawing/2014/main" val="20011"/>
+                      <a16:colId xmlns:a16="http://schemas.microsoft.com/office/drawing/2014/main" xmlns="" val="20011"/>
                     </a:ext>
                   </a:extLst>
                 </a:gridCol>
@@ -3565,7 +3565,7 @@
                 </a:tc>
                 <a:extLst>
                   <a:ext uri="{0D108BD9-81ED-4DB2-BD59-A6C34878D82A}">
-                    <a16:rowId xmlns:a16="http://schemas.microsoft.com/office/drawing/2014/main" val="10000"/>
+                    <a16:rowId xmlns:a16="http://schemas.microsoft.com/office/drawing/2014/main" xmlns="" val="10000"/>
                   </a:ext>
                 </a:extLst>
               </a:tr>
@@ -3857,7 +3857,7 @@
                 </a:tc>
                 <a:extLst>
                   <a:ext uri="{0D108BD9-81ED-4DB2-BD59-A6C34878D82A}">
-                    <a16:rowId xmlns:a16="http://schemas.microsoft.com/office/drawing/2014/main" val="10001"/>
+                    <a16:rowId xmlns:a16="http://schemas.microsoft.com/office/drawing/2014/main" xmlns="" val="10001"/>
                   </a:ext>
                 </a:extLst>
               </a:tr>
@@ -4143,7 +4143,7 @@
                 </a:tc>
                 <a:extLst>
                   <a:ext uri="{0D108BD9-81ED-4DB2-BD59-A6C34878D82A}">
-                    <a16:rowId xmlns:a16="http://schemas.microsoft.com/office/drawing/2014/main" val="10002"/>
+                    <a16:rowId xmlns:a16="http://schemas.microsoft.com/office/drawing/2014/main" xmlns="" val="10002"/>
                   </a:ext>
                 </a:extLst>
               </a:tr>
@@ -4429,7 +4429,7 @@
                 </a:tc>
                 <a:extLst>
                   <a:ext uri="{0D108BD9-81ED-4DB2-BD59-A6C34878D82A}">
-                    <a16:rowId xmlns:a16="http://schemas.microsoft.com/office/drawing/2014/main" val="10003"/>
+                    <a16:rowId xmlns:a16="http://schemas.microsoft.com/office/drawing/2014/main" xmlns="" val="10003"/>
                   </a:ext>
                 </a:extLst>
               </a:tr>
@@ -4715,7 +4715,7 @@
                 </a:tc>
                 <a:extLst>
                   <a:ext uri="{0D108BD9-81ED-4DB2-BD59-A6C34878D82A}">
-                    <a16:rowId xmlns:a16="http://schemas.microsoft.com/office/drawing/2014/main" val="10004"/>
+                    <a16:rowId xmlns:a16="http://schemas.microsoft.com/office/drawing/2014/main" xmlns="" val="10004"/>
                   </a:ext>
                 </a:extLst>
               </a:tr>
@@ -5001,7 +5001,7 @@
                 </a:tc>
                 <a:extLst>
                   <a:ext uri="{0D108BD9-81ED-4DB2-BD59-A6C34878D82A}">
-                    <a16:rowId xmlns:a16="http://schemas.microsoft.com/office/drawing/2014/main" val="10005"/>
+                    <a16:rowId xmlns:a16="http://schemas.microsoft.com/office/drawing/2014/main" xmlns="" val="10005"/>
                   </a:ext>
                 </a:extLst>
               </a:tr>
@@ -5287,7 +5287,7 @@
                 </a:tc>
                 <a:extLst>
                   <a:ext uri="{0D108BD9-81ED-4DB2-BD59-A6C34878D82A}">
-                    <a16:rowId xmlns:a16="http://schemas.microsoft.com/office/drawing/2014/main" val="10006"/>
+                    <a16:rowId xmlns:a16="http://schemas.microsoft.com/office/drawing/2014/main" xmlns="" val="10006"/>
                   </a:ext>
                 </a:extLst>
               </a:tr>
@@ -5573,7 +5573,7 @@
                 </a:tc>
                 <a:extLst>
                   <a:ext uri="{0D108BD9-81ED-4DB2-BD59-A6C34878D82A}">
-                    <a16:rowId xmlns:a16="http://schemas.microsoft.com/office/drawing/2014/main" val="10007"/>
+                    <a16:rowId xmlns:a16="http://schemas.microsoft.com/office/drawing/2014/main" xmlns="" val="10007"/>
                   </a:ext>
                 </a:extLst>
               </a:tr>
@@ -5859,7 +5859,7 @@
                 </a:tc>
                 <a:extLst>
                   <a:ext uri="{0D108BD9-81ED-4DB2-BD59-A6C34878D82A}">
-                    <a16:rowId xmlns:a16="http://schemas.microsoft.com/office/drawing/2014/main" val="10008"/>
+                    <a16:rowId xmlns:a16="http://schemas.microsoft.com/office/drawing/2014/main" xmlns="" val="10008"/>
                   </a:ext>
                 </a:extLst>
               </a:tr>
@@ -5933,7 +5933,7 @@
         <p:spPr/>
         <p:txBody>
           <a:bodyPr>
-            <a:normAutofit/>
+            <a:normAutofit fontScale="85000" lnSpcReduction="20000"/>
           </a:bodyPr>
           <a:lstStyle/>
           <a:p>
@@ -5999,9 +5999,91 @@
               <a:t>in </a:t>
             </a:r>
             <a:r>
+              <a:rPr lang="en-US" dirty="0">
+                <a:hlinkClick r:id="rId2"/>
+              </a:rPr>
+              <a:t>https://</a:t>
+            </a:r>
+            <a:r>
+              <a:rPr lang="en-US" dirty="0" smtClean="0">
+                <a:hlinkClick r:id="rId2"/>
+              </a:rPr>
+              <a:t>github.com/JunoLab/uber-juno/blob/master/setup.md</a:t>
+            </a:r>
+            <a:endParaRPr lang="en-US" dirty="0" smtClean="0"/>
+          </a:p>
+          <a:p>
+            <a:pPr lvl="1"/>
+            <a:endParaRPr lang="en-US" dirty="0"/>
+          </a:p>
+          <a:p>
+            <a:r>
+              <a:rPr lang="en-US" dirty="0" smtClean="0"/>
+              <a:t>ECCO </a:t>
+            </a:r>
+            <a:r>
+              <a:rPr lang="en-US" dirty="0" err="1" smtClean="0"/>
+              <a:t>Juila</a:t>
+            </a:r>
+            <a:endParaRPr lang="en-US" dirty="0" smtClean="0"/>
+          </a:p>
+          <a:p>
+            <a:pPr lvl="1"/>
+            <a:r>
+              <a:rPr lang="en-US" dirty="0" smtClean="0"/>
+              <a:t>On your </a:t>
+            </a:r>
+            <a:r>
+              <a:rPr lang="en-US" dirty="0" err="1" smtClean="0"/>
+              <a:t>ecco</a:t>
+            </a:r>
+            <a:r>
+              <a:rPr lang="en-US" smtClean="0"/>
+              <a:t> shell, type:</a:t>
+            </a:r>
+            <a:endParaRPr lang="en-US" dirty="0" smtClean="0"/>
+          </a:p>
+          <a:p>
+            <a:pPr lvl="1"/>
+            <a:r>
+              <a:rPr lang="en-US" dirty="0" err="1"/>
+              <a:t>qsub</a:t>
+            </a:r>
+            <a:r>
               <a:rPr lang="en-US" dirty="0"/>
-              <a:t>https://github.com/JunoLab/uber-juno/blob/master/setup.md</a:t>
-            </a:r>
+              <a:t> -I -q interactive -l </a:t>
+            </a:r>
+            <a:r>
+              <a:rPr lang="en-US" dirty="0" smtClean="0"/>
+              <a:t>nodes=compute-0-1</a:t>
+            </a:r>
+          </a:p>
+          <a:p>
+            <a:pPr lvl="1"/>
+            <a:r>
+              <a:rPr lang="en-US" dirty="0"/>
+              <a:t>m</a:t>
+            </a:r>
+            <a:r>
+              <a:rPr lang="en-US" dirty="0" smtClean="0"/>
+              <a:t>odule load </a:t>
+            </a:r>
+            <a:r>
+              <a:rPr lang="en-US" dirty="0" err="1" smtClean="0"/>
+              <a:t>julia</a:t>
+            </a:r>
+            <a:endParaRPr lang="en-US" dirty="0" smtClean="0"/>
+          </a:p>
+          <a:p>
+            <a:pPr lvl="1"/>
+            <a:r>
+              <a:rPr lang="en-US" dirty="0" err="1" smtClean="0"/>
+              <a:t>julia</a:t>
+            </a:r>
+            <a:endParaRPr lang="en-US" dirty="0" smtClean="0"/>
+          </a:p>
+          <a:p>
+            <a:pPr lvl="1"/>
             <a:endParaRPr lang="en-US" dirty="0" smtClean="0"/>
           </a:p>
           <a:p>
@@ -6112,7 +6194,6 @@
               <a:rPr lang="en-US" dirty="0" smtClean="0"/>
               <a:t>Documentation </a:t>
             </a:r>
-            <a:endParaRPr lang="en-US" dirty="0" smtClean="0"/>
           </a:p>
           <a:p>
             <a:pPr lvl="1"/>

</xml_diff>